<commit_message>
updating M2det trainset maker
</commit_message>
<xml_diff>
--- a/발표자료/CCMCT_중간발표.pptx
+++ b/발표자료/CCMCT_중간발표.pptx
@@ -272,7 +272,7 @@
           <a:p>
             <a:fld id="{E7B65EDB-652F-4E7A-AE52-E3012E96CC71}" type="datetimeFigureOut">
               <a:rPr lang="ko-KR" altLang="en-US" smtClean="0"/>
-              <a:t>2021-08-24</a:t>
+              <a:t>2021-08-25</a:t>
             </a:fld>
             <a:endParaRPr lang="ko-KR" altLang="en-US"/>
           </a:p>
@@ -470,7 +470,7 @@
           <a:p>
             <a:fld id="{E7B65EDB-652F-4E7A-AE52-E3012E96CC71}" type="datetimeFigureOut">
               <a:rPr lang="ko-KR" altLang="en-US" smtClean="0"/>
-              <a:t>2021-08-24</a:t>
+              <a:t>2021-08-25</a:t>
             </a:fld>
             <a:endParaRPr lang="ko-KR" altLang="en-US"/>
           </a:p>
@@ -678,7 +678,7 @@
           <a:p>
             <a:fld id="{E7B65EDB-652F-4E7A-AE52-E3012E96CC71}" type="datetimeFigureOut">
               <a:rPr lang="ko-KR" altLang="en-US" smtClean="0"/>
-              <a:t>2021-08-24</a:t>
+              <a:t>2021-08-25</a:t>
             </a:fld>
             <a:endParaRPr lang="ko-KR" altLang="en-US"/>
           </a:p>
@@ -876,7 +876,7 @@
           <a:p>
             <a:fld id="{E7B65EDB-652F-4E7A-AE52-E3012E96CC71}" type="datetimeFigureOut">
               <a:rPr lang="ko-KR" altLang="en-US" smtClean="0"/>
-              <a:t>2021-08-24</a:t>
+              <a:t>2021-08-25</a:t>
             </a:fld>
             <a:endParaRPr lang="ko-KR" altLang="en-US"/>
           </a:p>
@@ -1151,7 +1151,7 @@
           <a:p>
             <a:fld id="{E7B65EDB-652F-4E7A-AE52-E3012E96CC71}" type="datetimeFigureOut">
               <a:rPr lang="ko-KR" altLang="en-US" smtClean="0"/>
-              <a:t>2021-08-24</a:t>
+              <a:t>2021-08-25</a:t>
             </a:fld>
             <a:endParaRPr lang="ko-KR" altLang="en-US"/>
           </a:p>
@@ -1416,7 +1416,7 @@
           <a:p>
             <a:fld id="{E7B65EDB-652F-4E7A-AE52-E3012E96CC71}" type="datetimeFigureOut">
               <a:rPr lang="ko-KR" altLang="en-US" smtClean="0"/>
-              <a:t>2021-08-24</a:t>
+              <a:t>2021-08-25</a:t>
             </a:fld>
             <a:endParaRPr lang="ko-KR" altLang="en-US"/>
           </a:p>
@@ -1828,7 +1828,7 @@
           <a:p>
             <a:fld id="{E7B65EDB-652F-4E7A-AE52-E3012E96CC71}" type="datetimeFigureOut">
               <a:rPr lang="ko-KR" altLang="en-US" smtClean="0"/>
-              <a:t>2021-08-24</a:t>
+              <a:t>2021-08-25</a:t>
             </a:fld>
             <a:endParaRPr lang="ko-KR" altLang="en-US"/>
           </a:p>
@@ -1969,7 +1969,7 @@
           <a:p>
             <a:fld id="{E7B65EDB-652F-4E7A-AE52-E3012E96CC71}" type="datetimeFigureOut">
               <a:rPr lang="ko-KR" altLang="en-US" smtClean="0"/>
-              <a:t>2021-08-24</a:t>
+              <a:t>2021-08-25</a:t>
             </a:fld>
             <a:endParaRPr lang="ko-KR" altLang="en-US"/>
           </a:p>
@@ -2082,7 +2082,7 @@
           <a:p>
             <a:fld id="{E7B65EDB-652F-4E7A-AE52-E3012E96CC71}" type="datetimeFigureOut">
               <a:rPr lang="ko-KR" altLang="en-US" smtClean="0"/>
-              <a:t>2021-08-24</a:t>
+              <a:t>2021-08-25</a:t>
             </a:fld>
             <a:endParaRPr lang="ko-KR" altLang="en-US"/>
           </a:p>
@@ -2393,7 +2393,7 @@
           <a:p>
             <a:fld id="{E7B65EDB-652F-4E7A-AE52-E3012E96CC71}" type="datetimeFigureOut">
               <a:rPr lang="ko-KR" altLang="en-US" smtClean="0"/>
-              <a:t>2021-08-24</a:t>
+              <a:t>2021-08-25</a:t>
             </a:fld>
             <a:endParaRPr lang="ko-KR" altLang="en-US"/>
           </a:p>
@@ -2681,7 +2681,7 @@
           <a:p>
             <a:fld id="{E7B65EDB-652F-4E7A-AE52-E3012E96CC71}" type="datetimeFigureOut">
               <a:rPr lang="ko-KR" altLang="en-US" smtClean="0"/>
-              <a:t>2021-08-24</a:t>
+              <a:t>2021-08-25</a:t>
             </a:fld>
             <a:endParaRPr lang="ko-KR" altLang="en-US"/>
           </a:p>
@@ -2922,7 +2922,7 @@
           <a:p>
             <a:fld id="{E7B65EDB-652F-4E7A-AE52-E3012E96CC71}" type="datetimeFigureOut">
               <a:rPr lang="ko-KR" altLang="en-US" smtClean="0"/>
-              <a:t>2021-08-24</a:t>
+              <a:t>2021-08-25</a:t>
             </a:fld>
             <a:endParaRPr lang="ko-KR" altLang="en-US"/>
           </a:p>

</xml_diff>